<commit_message>
FT_SyncLabTest: Add test to confirm clipboard is restored after copy
</commit_message>
<xml_diff>
--- a/doc/test/SyncLab/SyncLab.pptx
+++ b/doc/test/SyncLab/SyncLab.pptx
@@ -8,7 +8,7 @@
     <p:sldMasterId id="2147483684" r:id="rId4"/>
   </p:sldMasterIdLst>
   <p:notesMasterIdLst>
-    <p:notesMasterId r:id="rId53"/>
+    <p:notesMasterId r:id="rId56"/>
   </p:notesMasterIdLst>
   <p:sldIdLst>
     <p:sldId id="287" r:id="rId5"/>
@@ -59,6 +59,9 @@
     <p:sldId id="418" r:id="rId50"/>
     <p:sldId id="419" r:id="rId51"/>
     <p:sldId id="420" r:id="rId52"/>
+    <p:sldId id="421" r:id="rId53"/>
+    <p:sldId id="423" r:id="rId54"/>
+    <p:sldId id="424" r:id="rId55"/>
   </p:sldIdLst>
   <p:sldSz cx="9144000" cy="6858000" type="screen4x3"/>
   <p:notesSz cx="6858000" cy="9144000"/>
@@ -236,6 +239,13 @@
             <p14:sldId id="420"/>
           </p14:sldIdLst>
         </p14:section>
+        <p14:section name="Sync Check Clipboard Restored" id="{4191734C-141A-41F0-AE60-8594224F844E}">
+          <p14:sldIdLst>
+            <p14:sldId id="421"/>
+            <p14:sldId id="423"/>
+            <p14:sldId id="424"/>
+          </p14:sldIdLst>
+        </p14:section>
       </p14:sectionLst>
     </p:ext>
     <p:ext uri="{EFAFB233-063F-42B5-8137-9DF3F51BA10A}">
@@ -243,10 +253,6 @@
     </p:ext>
   </p:extLst>
 </p:presentation>
-</file>
-
-<file path=ppt/revisionInfo.xml><?xml version="1.0" encoding="utf-8"?>
-<p1510:revInfo xmlns:a="http://schemas.openxmlformats.org/drawingml/2006/main" xmlns:r="http://schemas.openxmlformats.org/officeDocument/2006/relationships" xmlns:p1510="http://schemas.microsoft.com/office/powerpoint/2015/10/main"/>
 </file>
 
 <file path=ppt/charts/chart1.xml><?xml version="1.0" encoding="utf-8"?>
@@ -3911,7 +3917,7 @@
           <a:p>
             <a:fld id="{43E32005-3A63-48D2-8C73-BF5F95786EBD}" type="datetimeFigureOut">
               <a:rPr lang="en-US" smtClean="0"/>
-              <a:t>4/11/2018</a:t>
+              <a:t>2/11/2020</a:t>
             </a:fld>
             <a:endParaRPr lang="en-US"/>
           </a:p>
@@ -7843,6 +7849,180 @@
 </p:notes>
 </file>
 
+<file path=ppt/notesSlides/notesSlide41.xml><?xml version="1.0" encoding="utf-8"?>
+<p:notes xmlns:a="http://schemas.openxmlformats.org/drawingml/2006/main" xmlns:r="http://schemas.openxmlformats.org/officeDocument/2006/relationships" xmlns:p="http://schemas.openxmlformats.org/presentationml/2006/main">
+  <p:cSld>
+    <p:spTree>
+      <p:nvGrpSpPr>
+        <p:cNvPr id="1" name=""/>
+        <p:cNvGrpSpPr/>
+        <p:nvPr/>
+      </p:nvGrpSpPr>
+      <p:grpSpPr>
+        <a:xfrm>
+          <a:off x="0" y="0"/>
+          <a:ext cx="0" cy="0"/>
+          <a:chOff x="0" y="0"/>
+          <a:chExt cx="0" cy="0"/>
+        </a:xfrm>
+      </p:grpSpPr>
+      <p:sp>
+        <p:nvSpPr>
+          <p:cNvPr id="2" name="Slide Image Placeholder 1"/>
+          <p:cNvSpPr>
+            <a:spLocks noGrp="1" noRot="1" noChangeAspect="1"/>
+          </p:cNvSpPr>
+          <p:nvPr>
+            <p:ph type="sldImg"/>
+          </p:nvPr>
+        </p:nvSpPr>
+        <p:spPr/>
+      </p:sp>
+      <p:sp>
+        <p:nvSpPr>
+          <p:cNvPr id="3" name="Notes Placeholder 2"/>
+          <p:cNvSpPr>
+            <a:spLocks noGrp="1"/>
+          </p:cNvSpPr>
+          <p:nvPr>
+            <p:ph type="body" idx="1"/>
+          </p:nvPr>
+        </p:nvSpPr>
+        <p:spPr/>
+        <p:txBody>
+          <a:bodyPr/>
+          <a:lstStyle/>
+          <a:p>
+            <a:r>
+              <a:rPr lang="en-US" dirty="0"/>
+              <a:t>SmartArt</a:t>
+            </a:r>
+          </a:p>
+        </p:txBody>
+      </p:sp>
+      <p:sp>
+        <p:nvSpPr>
+          <p:cNvPr id="4" name="Slide Number Placeholder 3"/>
+          <p:cNvSpPr>
+            <a:spLocks noGrp="1"/>
+          </p:cNvSpPr>
+          <p:nvPr>
+            <p:ph type="sldNum" sz="quarter" idx="10"/>
+          </p:nvPr>
+        </p:nvSpPr>
+        <p:spPr/>
+        <p:txBody>
+          <a:bodyPr/>
+          <a:lstStyle/>
+          <a:p>
+            <a:fld id="{0FE7C38A-472B-4221-8E00-509E1DA863EC}" type="slidenum">
+              <a:rPr lang="en-US" smtClean="0"/>
+              <a:t>50</a:t>
+            </a:fld>
+            <a:endParaRPr lang="en-US"/>
+          </a:p>
+        </p:txBody>
+      </p:sp>
+    </p:spTree>
+    <p:extLst>
+      <p:ext uri="{BB962C8B-B14F-4D97-AF65-F5344CB8AC3E}">
+        <p14:creationId xmlns:p14="http://schemas.microsoft.com/office/powerpoint/2010/main" val="1022996770"/>
+      </p:ext>
+    </p:extLst>
+  </p:cSld>
+  <p:clrMapOvr>
+    <a:masterClrMapping/>
+  </p:clrMapOvr>
+</p:notes>
+</file>
+
+<file path=ppt/notesSlides/notesSlide42.xml><?xml version="1.0" encoding="utf-8"?>
+<p:notes xmlns:a="http://schemas.openxmlformats.org/drawingml/2006/main" xmlns:r="http://schemas.openxmlformats.org/officeDocument/2006/relationships" xmlns:p="http://schemas.openxmlformats.org/presentationml/2006/main">
+  <p:cSld>
+    <p:spTree>
+      <p:nvGrpSpPr>
+        <p:cNvPr id="1" name=""/>
+        <p:cNvGrpSpPr/>
+        <p:nvPr/>
+      </p:nvGrpSpPr>
+      <p:grpSpPr>
+        <a:xfrm>
+          <a:off x="0" y="0"/>
+          <a:ext cx="0" cy="0"/>
+          <a:chOff x="0" y="0"/>
+          <a:chExt cx="0" cy="0"/>
+        </a:xfrm>
+      </p:grpSpPr>
+      <p:sp>
+        <p:nvSpPr>
+          <p:cNvPr id="2" name="Slide Image Placeholder 1"/>
+          <p:cNvSpPr>
+            <a:spLocks noGrp="1" noRot="1" noChangeAspect="1"/>
+          </p:cNvSpPr>
+          <p:nvPr>
+            <p:ph type="sldImg"/>
+          </p:nvPr>
+        </p:nvSpPr>
+        <p:spPr/>
+      </p:sp>
+      <p:sp>
+        <p:nvSpPr>
+          <p:cNvPr id="3" name="Notes Placeholder 2"/>
+          <p:cNvSpPr>
+            <a:spLocks noGrp="1"/>
+          </p:cNvSpPr>
+          <p:nvPr>
+            <p:ph type="body" idx="1"/>
+          </p:nvPr>
+        </p:nvSpPr>
+        <p:spPr/>
+        <p:txBody>
+          <a:bodyPr/>
+          <a:lstStyle/>
+          <a:p>
+            <a:r>
+              <a:rPr lang="en-US" dirty="0"/>
+              <a:t>SmartArt</a:t>
+            </a:r>
+          </a:p>
+        </p:txBody>
+      </p:sp>
+      <p:sp>
+        <p:nvSpPr>
+          <p:cNvPr id="4" name="Slide Number Placeholder 3"/>
+          <p:cNvSpPr>
+            <a:spLocks noGrp="1"/>
+          </p:cNvSpPr>
+          <p:nvPr>
+            <p:ph type="sldNum" sz="quarter" idx="10"/>
+          </p:nvPr>
+        </p:nvSpPr>
+        <p:spPr/>
+        <p:txBody>
+          <a:bodyPr/>
+          <a:lstStyle/>
+          <a:p>
+            <a:fld id="{0FE7C38A-472B-4221-8E00-509E1DA863EC}" type="slidenum">
+              <a:rPr lang="en-US" smtClean="0"/>
+              <a:t>51</a:t>
+            </a:fld>
+            <a:endParaRPr lang="en-US"/>
+          </a:p>
+        </p:txBody>
+      </p:sp>
+    </p:spTree>
+    <p:extLst>
+      <p:ext uri="{BB962C8B-B14F-4D97-AF65-F5344CB8AC3E}">
+        <p14:creationId xmlns:p14="http://schemas.microsoft.com/office/powerpoint/2010/main" val="453286312"/>
+      </p:ext>
+    </p:extLst>
+  </p:cSld>
+  <p:clrMapOvr>
+    <a:masterClrMapping/>
+  </p:clrMapOvr>
+</p:notes>
+</file>
+
 <file path=ppt/notesSlides/notesSlide5.xml><?xml version="1.0" encoding="utf-8"?>
 <p:notes xmlns:a="http://schemas.openxmlformats.org/drawingml/2006/main" xmlns:r="http://schemas.openxmlformats.org/officeDocument/2006/relationships" xmlns:p="http://schemas.openxmlformats.org/presentationml/2006/main">
   <p:cSld>
@@ -8670,7 +8850,7 @@
           <a:p>
             <a:fld id="{699DC775-C286-4358-8C92-D7E584E969B3}" type="datetimeFigureOut">
               <a:rPr lang="en-US" smtClean="0"/>
-              <a:t>4/11/2018</a:t>
+              <a:t>2/11/2020</a:t>
             </a:fld>
             <a:endParaRPr lang="en-US"/>
           </a:p>
@@ -8838,7 +9018,7 @@
           <a:p>
             <a:fld id="{699DC775-C286-4358-8C92-D7E584E969B3}" type="datetimeFigureOut">
               <a:rPr lang="en-US" smtClean="0"/>
-              <a:t>4/11/2018</a:t>
+              <a:t>2/11/2020</a:t>
             </a:fld>
             <a:endParaRPr lang="en-US"/>
           </a:p>
@@ -9016,7 +9196,7 @@
           <a:p>
             <a:fld id="{699DC775-C286-4358-8C92-D7E584E969B3}" type="datetimeFigureOut">
               <a:rPr lang="en-US" smtClean="0"/>
-              <a:t>4/11/2018</a:t>
+              <a:t>2/11/2020</a:t>
             </a:fld>
             <a:endParaRPr lang="en-US"/>
           </a:p>
@@ -9256,7 +9436,7 @@
           <a:p>
             <a:fld id="{699DC775-C286-4358-8C92-D7E584E969B3}" type="datetimeFigureOut">
               <a:rPr lang="en-US" smtClean="0"/>
-              <a:t>4/11/2018</a:t>
+              <a:t>2/11/2020</a:t>
             </a:fld>
             <a:endParaRPr lang="en-US"/>
           </a:p>
@@ -9424,7 +9604,7 @@
           <a:p>
             <a:fld id="{699DC775-C286-4358-8C92-D7E584E969B3}" type="datetimeFigureOut">
               <a:rPr lang="en-US" smtClean="0"/>
-              <a:t>4/11/2018</a:t>
+              <a:t>2/11/2020</a:t>
             </a:fld>
             <a:endParaRPr lang="en-US"/>
           </a:p>
@@ -9669,7 +9849,7 @@
           <a:p>
             <a:fld id="{699DC775-C286-4358-8C92-D7E584E969B3}" type="datetimeFigureOut">
               <a:rPr lang="en-US" smtClean="0"/>
-              <a:t>4/11/2018</a:t>
+              <a:t>2/11/2020</a:t>
             </a:fld>
             <a:endParaRPr lang="en-US"/>
           </a:p>
@@ -9954,7 +10134,7 @@
           <a:p>
             <a:fld id="{699DC775-C286-4358-8C92-D7E584E969B3}" type="datetimeFigureOut">
               <a:rPr lang="en-US" smtClean="0"/>
-              <a:t>4/11/2018</a:t>
+              <a:t>2/11/2020</a:t>
             </a:fld>
             <a:endParaRPr lang="en-US"/>
           </a:p>
@@ -10373,7 +10553,7 @@
           <a:p>
             <a:fld id="{699DC775-C286-4358-8C92-D7E584E969B3}" type="datetimeFigureOut">
               <a:rPr lang="en-US" smtClean="0"/>
-              <a:t>4/11/2018</a:t>
+              <a:t>2/11/2020</a:t>
             </a:fld>
             <a:endParaRPr lang="en-US"/>
           </a:p>
@@ -10490,7 +10670,7 @@
           <a:p>
             <a:fld id="{699DC775-C286-4358-8C92-D7E584E969B3}" type="datetimeFigureOut">
               <a:rPr lang="en-US" smtClean="0"/>
-              <a:t>4/11/2018</a:t>
+              <a:t>2/11/2020</a:t>
             </a:fld>
             <a:endParaRPr lang="en-US"/>
           </a:p>
@@ -10585,7 +10765,7 @@
           <a:p>
             <a:fld id="{699DC775-C286-4358-8C92-D7E584E969B3}" type="datetimeFigureOut">
               <a:rPr lang="en-US" smtClean="0"/>
-              <a:t>4/11/2018</a:t>
+              <a:t>2/11/2020</a:t>
             </a:fld>
             <a:endParaRPr lang="en-US"/>
           </a:p>
@@ -10860,7 +11040,7 @@
           <a:p>
             <a:fld id="{699DC775-C286-4358-8C92-D7E584E969B3}" type="datetimeFigureOut">
               <a:rPr lang="en-US" smtClean="0"/>
-              <a:t>4/11/2018</a:t>
+              <a:t>2/11/2020</a:t>
             </a:fld>
             <a:endParaRPr lang="en-US"/>
           </a:p>
@@ -11028,7 +11208,7 @@
           <a:p>
             <a:fld id="{699DC775-C286-4358-8C92-D7E584E969B3}" type="datetimeFigureOut">
               <a:rPr lang="en-US" smtClean="0"/>
-              <a:t>4/11/2018</a:t>
+              <a:t>2/11/2020</a:t>
             </a:fld>
             <a:endParaRPr lang="en-US"/>
           </a:p>
@@ -11280,7 +11460,7 @@
           <a:p>
             <a:fld id="{699DC775-C286-4358-8C92-D7E584E969B3}" type="datetimeFigureOut">
               <a:rPr lang="en-US" smtClean="0"/>
-              <a:t>4/11/2018</a:t>
+              <a:t>2/11/2020</a:t>
             </a:fld>
             <a:endParaRPr lang="en-US"/>
           </a:p>
@@ -11448,7 +11628,7 @@
           <a:p>
             <a:fld id="{699DC775-C286-4358-8C92-D7E584E969B3}" type="datetimeFigureOut">
               <a:rPr lang="en-US" smtClean="0"/>
-              <a:t>4/11/2018</a:t>
+              <a:t>2/11/2020</a:t>
             </a:fld>
             <a:endParaRPr lang="en-US"/>
           </a:p>
@@ -11626,7 +11806,7 @@
           <a:p>
             <a:fld id="{699DC775-C286-4358-8C92-D7E584E969B3}" type="datetimeFigureOut">
               <a:rPr lang="en-US" smtClean="0"/>
-              <a:t>4/11/2018</a:t>
+              <a:t>2/11/2020</a:t>
             </a:fld>
             <a:endParaRPr lang="en-US"/>
           </a:p>
@@ -11874,7 +12054,7 @@
           <a:p>
             <a:fld id="{699DC775-C286-4358-8C92-D7E584E969B3}" type="datetimeFigureOut">
               <a:rPr lang="en-US" smtClean="0"/>
-              <a:t>4/11/2018</a:t>
+              <a:t>2/11/2020</a:t>
             </a:fld>
             <a:endParaRPr lang="en-US"/>
           </a:p>
@@ -12050,7 +12230,7 @@
           <a:p>
             <a:fld id="{699DC775-C286-4358-8C92-D7E584E969B3}" type="datetimeFigureOut">
               <a:rPr lang="en-US" smtClean="0"/>
-              <a:t>4/11/2018</a:t>
+              <a:t>2/11/2020</a:t>
             </a:fld>
             <a:endParaRPr lang="en-US"/>
           </a:p>
@@ -12303,7 +12483,7 @@
           <a:p>
             <a:fld id="{699DC775-C286-4358-8C92-D7E584E969B3}" type="datetimeFigureOut">
               <a:rPr lang="en-US" smtClean="0"/>
-              <a:t>4/11/2018</a:t>
+              <a:t>2/11/2020</a:t>
             </a:fld>
             <a:endParaRPr lang="en-US"/>
           </a:p>
@@ -12596,7 +12776,7 @@
           <a:p>
             <a:fld id="{699DC775-C286-4358-8C92-D7E584E969B3}" type="datetimeFigureOut">
               <a:rPr lang="en-US" smtClean="0"/>
-              <a:t>4/11/2018</a:t>
+              <a:t>2/11/2020</a:t>
             </a:fld>
             <a:endParaRPr lang="en-US"/>
           </a:p>
@@ -13023,7 +13203,7 @@
           <a:p>
             <a:fld id="{699DC775-C286-4358-8C92-D7E584E969B3}" type="datetimeFigureOut">
               <a:rPr lang="en-US" smtClean="0"/>
-              <a:t>4/11/2018</a:t>
+              <a:t>2/11/2020</a:t>
             </a:fld>
             <a:endParaRPr lang="en-US"/>
           </a:p>
@@ -13148,7 +13328,7 @@
           <a:p>
             <a:fld id="{699DC775-C286-4358-8C92-D7E584E969B3}" type="datetimeFigureOut">
               <a:rPr lang="en-US" smtClean="0"/>
-              <a:t>4/11/2018</a:t>
+              <a:t>2/11/2020</a:t>
             </a:fld>
             <a:endParaRPr lang="en-US"/>
           </a:p>
@@ -13251,7 +13431,7 @@
           <a:p>
             <a:fld id="{699DC775-C286-4358-8C92-D7E584E969B3}" type="datetimeFigureOut">
               <a:rPr lang="en-US" smtClean="0"/>
-              <a:t>4/11/2018</a:t>
+              <a:t>2/11/2020</a:t>
             </a:fld>
             <a:endParaRPr lang="en-US"/>
           </a:p>
@@ -13496,7 +13676,7 @@
           <a:p>
             <a:fld id="{699DC775-C286-4358-8C92-D7E584E969B3}" type="datetimeFigureOut">
               <a:rPr lang="en-US" smtClean="0"/>
-              <a:t>4/11/2018</a:t>
+              <a:t>2/11/2020</a:t>
             </a:fld>
             <a:endParaRPr lang="en-US"/>
           </a:p>
@@ -13779,7 +13959,7 @@
           <a:p>
             <a:fld id="{699DC775-C286-4358-8C92-D7E584E969B3}" type="datetimeFigureOut">
               <a:rPr lang="en-US" smtClean="0"/>
-              <a:t>4/11/2018</a:t>
+              <a:t>2/11/2020</a:t>
             </a:fld>
             <a:endParaRPr lang="en-US"/>
           </a:p>
@@ -14039,7 +14219,7 @@
           <a:p>
             <a:fld id="{699DC775-C286-4358-8C92-D7E584E969B3}" type="datetimeFigureOut">
               <a:rPr lang="en-US" smtClean="0"/>
-              <a:t>4/11/2018</a:t>
+              <a:t>2/11/2020</a:t>
             </a:fld>
             <a:endParaRPr lang="en-US"/>
           </a:p>
@@ -14215,7 +14395,7 @@
           <a:p>
             <a:fld id="{699DC775-C286-4358-8C92-D7E584E969B3}" type="datetimeFigureOut">
               <a:rPr lang="en-US" smtClean="0"/>
-              <a:t>4/11/2018</a:t>
+              <a:t>2/11/2020</a:t>
             </a:fld>
             <a:endParaRPr lang="en-US"/>
           </a:p>
@@ -14401,7 +14581,7 @@
           <a:p>
             <a:fld id="{699DC775-C286-4358-8C92-D7E584E969B3}" type="datetimeFigureOut">
               <a:rPr lang="en-US" smtClean="0"/>
-              <a:t>4/11/2018</a:t>
+              <a:t>2/11/2020</a:t>
             </a:fld>
             <a:endParaRPr lang="en-US"/>
           </a:p>
@@ -14591,7 +14771,7 @@
           <a:p>
             <a:fld id="{45696B32-6A70-48EC-8939-9D142D9557CD}" type="datetimeFigureOut">
               <a:rPr lang="en-US" smtClean="0"/>
-              <a:t>4/11/2018</a:t>
+              <a:t>2/11/2020</a:t>
             </a:fld>
             <a:endParaRPr lang="en-US"/>
           </a:p>
@@ -14905,7 +15085,7 @@
           <a:p>
             <a:fld id="{45696B32-6A70-48EC-8939-9D142D9557CD}" type="datetimeFigureOut">
               <a:rPr lang="en-US" smtClean="0"/>
-              <a:t>4/11/2018</a:t>
+              <a:t>2/11/2020</a:t>
             </a:fld>
             <a:endParaRPr lang="en-US"/>
           </a:p>
@@ -15150,7 +15330,7 @@
           <a:p>
             <a:fld id="{45696B32-6A70-48EC-8939-9D142D9557CD}" type="datetimeFigureOut">
               <a:rPr lang="en-US" smtClean="0"/>
-              <a:t>4/11/2018</a:t>
+              <a:t>2/11/2020</a:t>
             </a:fld>
             <a:endParaRPr lang="en-US"/>
           </a:p>
@@ -15379,7 +15559,7 @@
           <a:p>
             <a:fld id="{45696B32-6A70-48EC-8939-9D142D9557CD}" type="datetimeFigureOut">
               <a:rPr lang="en-US" smtClean="0"/>
-              <a:t>4/11/2018</a:t>
+              <a:t>2/11/2020</a:t>
             </a:fld>
             <a:endParaRPr lang="en-US"/>
           </a:p>
@@ -15743,7 +15923,7 @@
           <a:p>
             <a:fld id="{45696B32-6A70-48EC-8939-9D142D9557CD}" type="datetimeFigureOut">
               <a:rPr lang="en-US" smtClean="0"/>
-              <a:t>4/11/2018</a:t>
+              <a:t>2/11/2020</a:t>
             </a:fld>
             <a:endParaRPr lang="en-US"/>
           </a:p>
@@ -15860,7 +16040,7 @@
           <a:p>
             <a:fld id="{45696B32-6A70-48EC-8939-9D142D9557CD}" type="datetimeFigureOut">
               <a:rPr lang="en-US" smtClean="0"/>
-              <a:t>4/11/2018</a:t>
+              <a:t>2/11/2020</a:t>
             </a:fld>
             <a:endParaRPr lang="en-US"/>
           </a:p>
@@ -16145,7 +16325,7 @@
           <a:p>
             <a:fld id="{699DC775-C286-4358-8C92-D7E584E969B3}" type="datetimeFigureOut">
               <a:rPr lang="en-US" smtClean="0"/>
-              <a:t>4/11/2018</a:t>
+              <a:t>2/11/2020</a:t>
             </a:fld>
             <a:endParaRPr lang="en-US"/>
           </a:p>
@@ -16240,7 +16420,7 @@
           <a:p>
             <a:fld id="{45696B32-6A70-48EC-8939-9D142D9557CD}" type="datetimeFigureOut">
               <a:rPr lang="en-US" smtClean="0"/>
-              <a:t>4/11/2018</a:t>
+              <a:t>2/11/2020</a:t>
             </a:fld>
             <a:endParaRPr lang="en-US"/>
           </a:p>
@@ -16515,7 +16695,7 @@
           <a:p>
             <a:fld id="{45696B32-6A70-48EC-8939-9D142D9557CD}" type="datetimeFigureOut">
               <a:rPr lang="en-US" smtClean="0"/>
-              <a:t>4/11/2018</a:t>
+              <a:t>2/11/2020</a:t>
             </a:fld>
             <a:endParaRPr lang="en-US"/>
           </a:p>
@@ -16767,7 +16947,7 @@
           <a:p>
             <a:fld id="{45696B32-6A70-48EC-8939-9D142D9557CD}" type="datetimeFigureOut">
               <a:rPr lang="en-US" smtClean="0"/>
-              <a:t>4/11/2018</a:t>
+              <a:t>2/11/2020</a:t>
             </a:fld>
             <a:endParaRPr lang="en-US"/>
           </a:p>
@@ -16935,7 +17115,7 @@
           <a:p>
             <a:fld id="{45696B32-6A70-48EC-8939-9D142D9557CD}" type="datetimeFigureOut">
               <a:rPr lang="en-US" smtClean="0"/>
-              <a:t>4/11/2018</a:t>
+              <a:t>2/11/2020</a:t>
             </a:fld>
             <a:endParaRPr lang="en-US"/>
           </a:p>
@@ -17113,7 +17293,7 @@
           <a:p>
             <a:fld id="{45696B32-6A70-48EC-8939-9D142D9557CD}" type="datetimeFigureOut">
               <a:rPr lang="en-US" smtClean="0"/>
-              <a:t>4/11/2018</a:t>
+              <a:t>2/11/2020</a:t>
             </a:fld>
             <a:endParaRPr lang="en-US"/>
           </a:p>
@@ -17532,7 +17712,7 @@
           <a:p>
             <a:fld id="{699DC775-C286-4358-8C92-D7E584E969B3}" type="datetimeFigureOut">
               <a:rPr lang="en-US" smtClean="0"/>
-              <a:t>4/11/2018</a:t>
+              <a:t>2/11/2020</a:t>
             </a:fld>
             <a:endParaRPr lang="en-US"/>
           </a:p>
@@ -17649,7 +17829,7 @@
           <a:p>
             <a:fld id="{699DC775-C286-4358-8C92-D7E584E969B3}" type="datetimeFigureOut">
               <a:rPr lang="en-US" smtClean="0"/>
-              <a:t>4/11/2018</a:t>
+              <a:t>2/11/2020</a:t>
             </a:fld>
             <a:endParaRPr lang="en-US"/>
           </a:p>
@@ -17744,7 +17924,7 @@
           <a:p>
             <a:fld id="{699DC775-C286-4358-8C92-D7E584E969B3}" type="datetimeFigureOut">
               <a:rPr lang="en-US" smtClean="0"/>
-              <a:t>4/11/2018</a:t>
+              <a:t>2/11/2020</a:t>
             </a:fld>
             <a:endParaRPr lang="en-US"/>
           </a:p>
@@ -18019,7 +18199,7 @@
           <a:p>
             <a:fld id="{699DC775-C286-4358-8C92-D7E584E969B3}" type="datetimeFigureOut">
               <a:rPr lang="en-US" smtClean="0"/>
-              <a:t>4/11/2018</a:t>
+              <a:t>2/11/2020</a:t>
             </a:fld>
             <a:endParaRPr lang="en-US"/>
           </a:p>
@@ -18271,7 +18451,7 @@
           <a:p>
             <a:fld id="{699DC775-C286-4358-8C92-D7E584E969B3}" type="datetimeFigureOut">
               <a:rPr lang="en-US" smtClean="0"/>
-              <a:t>4/11/2018</a:t>
+              <a:t>2/11/2020</a:t>
             </a:fld>
             <a:endParaRPr lang="en-US"/>
           </a:p>
@@ -18482,7 +18662,7 @@
           <a:p>
             <a:fld id="{699DC775-C286-4358-8C92-D7E584E969B3}" type="datetimeFigureOut">
               <a:rPr lang="en-US" smtClean="0"/>
-              <a:t>4/11/2018</a:t>
+              <a:t>2/11/2020</a:t>
             </a:fld>
             <a:endParaRPr lang="en-US"/>
           </a:p>
@@ -18995,7 +19175,7 @@
           <a:p>
             <a:fld id="{699DC775-C286-4358-8C92-D7E584E969B3}" type="datetimeFigureOut">
               <a:rPr lang="en-US" smtClean="0"/>
-              <a:t>4/11/2018</a:t>
+              <a:t>2/11/2020</a:t>
             </a:fld>
             <a:endParaRPr lang="en-US"/>
           </a:p>
@@ -19506,7 +19686,7 @@
           <a:p>
             <a:fld id="{699DC775-C286-4358-8C92-D7E584E969B3}" type="datetimeFigureOut">
               <a:rPr lang="en-US" smtClean="0"/>
-              <a:t>4/11/2018</a:t>
+              <a:t>2/11/2020</a:t>
             </a:fld>
             <a:endParaRPr lang="en-US"/>
           </a:p>
@@ -20014,7 +20194,7 @@
           <a:p>
             <a:fld id="{45696B32-6A70-48EC-8939-9D142D9557CD}" type="datetimeFigureOut">
               <a:rPr lang="en-US" smtClean="0"/>
-              <a:t>4/11/2018</a:t>
+              <a:t>2/11/2020</a:t>
             </a:fld>
             <a:endParaRPr lang="en-US"/>
           </a:p>
@@ -33783,6 +33963,151 @@
 </p:sld>
 </file>
 
+<file path=ppt/slides/slide49.xml><?xml version="1.0" encoding="utf-8"?>
+<p:sld xmlns:a="http://schemas.openxmlformats.org/drawingml/2006/main" xmlns:r="http://schemas.openxmlformats.org/officeDocument/2006/relationships" xmlns:p="http://schemas.openxmlformats.org/presentationml/2006/main">
+  <p:cSld>
+    <p:spTree>
+      <p:nvGrpSpPr>
+        <p:cNvPr id="1" name=""/>
+        <p:cNvGrpSpPr/>
+        <p:nvPr/>
+      </p:nvGrpSpPr>
+      <p:grpSpPr>
+        <a:xfrm>
+          <a:off x="0" y="0"/>
+          <a:ext cx="0" cy="0"/>
+          <a:chOff x="0" y="0"/>
+          <a:chExt cx="0" cy="0"/>
+        </a:xfrm>
+      </p:grpSpPr>
+      <p:sp>
+        <p:nvSpPr>
+          <p:cNvPr id="2" name="Title 1"/>
+          <p:cNvSpPr>
+            <a:spLocks noGrp="1"/>
+          </p:cNvSpPr>
+          <p:nvPr>
+            <p:ph type="title"/>
+          </p:nvPr>
+        </p:nvSpPr>
+        <p:spPr/>
+        <p:txBody>
+          <a:bodyPr/>
+          <a:lstStyle/>
+          <a:p>
+            <a:r>
+              <a:rPr lang="en-US" dirty="0"/>
+              <a:t>Sync:: Check if clipboard is restored</a:t>
+            </a:r>
+            <a:endParaRPr lang="en-SG" dirty="0"/>
+          </a:p>
+        </p:txBody>
+      </p:sp>
+      <p:sp>
+        <p:nvSpPr>
+          <p:cNvPr id="4" name="Content Placeholder 3"/>
+          <p:cNvSpPr>
+            <a:spLocks noGrp="1"/>
+          </p:cNvSpPr>
+          <p:nvPr>
+            <p:ph idx="1"/>
+          </p:nvPr>
+        </p:nvSpPr>
+        <p:spPr/>
+        <p:txBody>
+          <a:bodyPr>
+            <a:normAutofit/>
+          </a:bodyPr>
+          <a:lstStyle/>
+          <a:p>
+            <a:pPr marL="0" indent="0">
+              <a:buNone/>
+            </a:pPr>
+            <a:r>
+              <a:rPr lang="en-US" b="1" dirty="0"/>
+              <a:t>Additional instructions:</a:t>
+            </a:r>
+          </a:p>
+          <a:p>
+            <a:pPr marL="285750" indent="-285750"/>
+            <a:r>
+              <a:rPr lang="en-US" dirty="0"/>
+              <a:t>Select the right </a:t>
+            </a:r>
+            <a:r>
+              <a:rPr lang="en-US" b="1" dirty="0"/>
+              <a:t>Shape </a:t>
+            </a:r>
+            <a:r>
+              <a:rPr lang="en-US" dirty="0"/>
+              <a:t>and copy it</a:t>
+            </a:r>
+            <a:endParaRPr lang="en-US" b="1" dirty="0"/>
+          </a:p>
+          <a:p>
+            <a:pPr marL="285750" indent="-285750"/>
+            <a:r>
+              <a:rPr lang="en-US" dirty="0"/>
+              <a:t>Select the left </a:t>
+            </a:r>
+            <a:r>
+              <a:rPr lang="en-US" b="1" dirty="0"/>
+              <a:t>Shape</a:t>
+            </a:r>
+            <a:endParaRPr lang="en-US" dirty="0"/>
+          </a:p>
+          <a:p>
+            <a:pPr marL="285750" indent="-285750"/>
+            <a:r>
+              <a:rPr lang="en-US" dirty="0"/>
+              <a:t>Click </a:t>
+            </a:r>
+            <a:r>
+              <a:rPr lang="en-US" b="1" dirty="0" err="1"/>
+              <a:t>SyncLab</a:t>
+            </a:r>
+            <a:r>
+              <a:rPr lang="en-US" dirty="0"/>
+              <a:t> Ribbon button.</a:t>
+            </a:r>
+          </a:p>
+          <a:p>
+            <a:pPr marL="285750" indent="-285750"/>
+            <a:r>
+              <a:rPr lang="en-US" dirty="0"/>
+              <a:t>Click </a:t>
+            </a:r>
+            <a:r>
+              <a:rPr lang="en-US" b="1" dirty="0"/>
+              <a:t>Copy</a:t>
+            </a:r>
+            <a:r>
+              <a:rPr lang="en-US" dirty="0"/>
+              <a:t> to copy the format and select all formats to copy</a:t>
+            </a:r>
+          </a:p>
+          <a:p>
+            <a:pPr marL="285750" indent="-285750"/>
+            <a:r>
+              <a:rPr lang="en-US" dirty="0"/>
+              <a:t>Paste your clipboard</a:t>
+            </a:r>
+          </a:p>
+        </p:txBody>
+      </p:sp>
+    </p:spTree>
+    <p:extLst>
+      <p:ext uri="{BB962C8B-B14F-4D97-AF65-F5344CB8AC3E}">
+        <p14:creationId xmlns:p14="http://schemas.microsoft.com/office/powerpoint/2010/main" val="3007595105"/>
+      </p:ext>
+    </p:extLst>
+  </p:cSld>
+  <p:clrMapOvr>
+    <a:masterClrMapping/>
+  </p:clrMapOvr>
+</p:sld>
+</file>
+
 <file path=ppt/slides/slide5.xml><?xml version="1.0" encoding="utf-8"?>
 <p:sld xmlns:a="http://schemas.openxmlformats.org/drawingml/2006/main" xmlns:r="http://schemas.openxmlformats.org/officeDocument/2006/relationships" xmlns:p="http://schemas.openxmlformats.org/presentationml/2006/main">
   <p:cSld>
@@ -33981,6 +34306,427 @@
     <p:extLst>
       <p:ext uri="{BB962C8B-B14F-4D97-AF65-F5344CB8AC3E}">
         <p14:creationId xmlns:p14="http://schemas.microsoft.com/office/powerpoint/2010/main" val="1539207427"/>
+      </p:ext>
+    </p:extLst>
+  </p:cSld>
+  <p:clrMapOvr>
+    <a:masterClrMapping/>
+  </p:clrMapOvr>
+</p:sld>
+</file>
+
+<file path=ppt/slides/slide50.xml><?xml version="1.0" encoding="utf-8"?>
+<p:sld xmlns:a="http://schemas.openxmlformats.org/drawingml/2006/main" xmlns:r="http://schemas.openxmlformats.org/officeDocument/2006/relationships" xmlns:p="http://schemas.openxmlformats.org/presentationml/2006/main">
+  <p:cSld>
+    <p:spTree>
+      <p:nvGrpSpPr>
+        <p:cNvPr id="1" name=""/>
+        <p:cNvGrpSpPr/>
+        <p:nvPr/>
+      </p:nvGrpSpPr>
+      <p:grpSpPr>
+        <a:xfrm>
+          <a:off x="0" y="0"/>
+          <a:ext cx="0" cy="0"/>
+          <a:chOff x="0" y="0"/>
+          <a:chExt cx="0" cy="0"/>
+        </a:xfrm>
+      </p:grpSpPr>
+      <p:sp>
+        <p:nvSpPr>
+          <p:cNvPr id="4" name="Sync Copy Shape">
+            <a:extLst>
+              <a:ext uri="{FF2B5EF4-FFF2-40B4-BE49-F238E27FC236}">
+                <a16:creationId xmlns:a16="http://schemas.microsoft.com/office/drawing/2014/main" id="{004F3CF6-C830-48E0-B8CB-29271412C202}"/>
+              </a:ext>
+            </a:extLst>
+          </p:cNvPr>
+          <p:cNvSpPr/>
+          <p:nvPr/>
+        </p:nvSpPr>
+        <p:spPr>
+          <a:xfrm>
+            <a:off x="1981200" y="2452810"/>
+            <a:ext cx="1952380" cy="1952380"/>
+          </a:xfrm>
+          <a:prstGeom prst="ellipse">
+            <a:avLst/>
+          </a:prstGeom>
+          <a:solidFill>
+            <a:schemeClr val="accent6"/>
+          </a:solidFill>
+          <a:ln w="76200" cap="flat" cmpd="sng" algn="ctr">
+            <a:solidFill>
+              <a:srgbClr val="FFC000"/>
+            </a:solidFill>
+            <a:prstDash val="dash"/>
+            <a:miter lim="800000"/>
+            <a:headEnd type="none" w="med" len="med"/>
+            <a:tailEnd type="none" w="med" len="med"/>
+          </a:ln>
+        </p:spPr>
+        <p:style>
+          <a:lnRef idx="2">
+            <a:schemeClr val="accent1">
+              <a:shade val="50000"/>
+            </a:schemeClr>
+          </a:lnRef>
+          <a:fillRef idx="1">
+            <a:schemeClr val="accent1"/>
+          </a:fillRef>
+          <a:effectRef idx="0">
+            <a:schemeClr val="accent1"/>
+          </a:effectRef>
+          <a:fontRef idx="minor">
+            <a:schemeClr val="lt1"/>
+          </a:fontRef>
+        </p:style>
+        <p:txBody>
+          <a:bodyPr vert="horz" rtlCol="0" anchor="ctr" anchorCtr="0"/>
+          <a:lstStyle/>
+          <a:p>
+            <a:pPr algn="ctr"/>
+            <a:r>
+              <a:rPr lang="en-SG" sz="2800" dirty="0" err="1">
+                <a:ln>
+                  <a:solidFill>
+                    <a:schemeClr val="tx1"/>
+                  </a:solidFill>
+                </a:ln>
+                <a:solidFill>
+                  <a:srgbClr val="FF0000"/>
+                </a:solidFill>
+                <a:latin typeface="Calibri" panose="020F0502020204030204" pitchFamily="34" charset="0"/>
+              </a:rPr>
+              <a:t>SyncLab</a:t>
+            </a:r>
+            <a:r>
+              <a:rPr lang="en-SG" sz="2800" dirty="0">
+                <a:ln>
+                  <a:solidFill>
+                    <a:schemeClr val="tx1"/>
+                  </a:solidFill>
+                </a:ln>
+                <a:solidFill>
+                  <a:srgbClr val="FF0000"/>
+                </a:solidFill>
+                <a:latin typeface="Calibri" panose="020F0502020204030204" pitchFamily="34" charset="0"/>
+              </a:rPr>
+              <a:t> Copy Me</a:t>
+            </a:r>
+          </a:p>
+        </p:txBody>
+      </p:sp>
+      <p:sp>
+        <p:nvSpPr>
+          <p:cNvPr id="5" name="Normal Copy Shape">
+            <a:extLst>
+              <a:ext uri="{FF2B5EF4-FFF2-40B4-BE49-F238E27FC236}">
+                <a16:creationId xmlns:a16="http://schemas.microsoft.com/office/drawing/2014/main" id="{141D9B7A-8C12-44A6-AD6D-376AF15CE3CF}"/>
+              </a:ext>
+            </a:extLst>
+          </p:cNvPr>
+          <p:cNvSpPr/>
+          <p:nvPr/>
+        </p:nvSpPr>
+        <p:spPr>
+          <a:xfrm>
+            <a:off x="5210420" y="2452810"/>
+            <a:ext cx="1952380" cy="1952380"/>
+          </a:xfrm>
+          <a:prstGeom prst="ellipse">
+            <a:avLst/>
+          </a:prstGeom>
+        </p:spPr>
+        <p:style>
+          <a:lnRef idx="2">
+            <a:schemeClr val="accent1">
+              <a:shade val="50000"/>
+            </a:schemeClr>
+          </a:lnRef>
+          <a:fillRef idx="1">
+            <a:schemeClr val="accent1"/>
+          </a:fillRef>
+          <a:effectRef idx="0">
+            <a:schemeClr val="accent1"/>
+          </a:effectRef>
+          <a:fontRef idx="minor">
+            <a:schemeClr val="lt1"/>
+          </a:fontRef>
+        </p:style>
+        <p:txBody>
+          <a:bodyPr rtlCol="0" anchor="ctr"/>
+          <a:lstStyle/>
+          <a:p>
+            <a:pPr algn="ctr"/>
+            <a:r>
+              <a:rPr lang="en-SG" sz="2400" dirty="0"/>
+              <a:t>Normal Copy Me First</a:t>
+            </a:r>
+          </a:p>
+        </p:txBody>
+      </p:sp>
+    </p:spTree>
+    <p:extLst>
+      <p:ext uri="{BB962C8B-B14F-4D97-AF65-F5344CB8AC3E}">
+        <p14:creationId xmlns:p14="http://schemas.microsoft.com/office/powerpoint/2010/main" val="1323946948"/>
+      </p:ext>
+    </p:extLst>
+  </p:cSld>
+  <p:clrMapOvr>
+    <a:masterClrMapping/>
+  </p:clrMapOvr>
+</p:sld>
+</file>
+
+<file path=ppt/slides/slide51.xml><?xml version="1.0" encoding="utf-8"?>
+<p:sld xmlns:a="http://schemas.openxmlformats.org/drawingml/2006/main" xmlns:r="http://schemas.openxmlformats.org/officeDocument/2006/relationships" xmlns:p="http://schemas.openxmlformats.org/presentationml/2006/main">
+  <p:cSld>
+    <p:spTree>
+      <p:nvGrpSpPr>
+        <p:cNvPr id="1" name=""/>
+        <p:cNvGrpSpPr/>
+        <p:nvPr/>
+      </p:nvGrpSpPr>
+      <p:grpSpPr>
+        <a:xfrm>
+          <a:off x="0" y="0"/>
+          <a:ext cx="0" cy="0"/>
+          <a:chOff x="0" y="0"/>
+          <a:chExt cx="0" cy="0"/>
+        </a:xfrm>
+      </p:grpSpPr>
+      <p:sp>
+        <p:nvSpPr>
+          <p:cNvPr id="4" name="Sync Copy Shape">
+            <a:extLst>
+              <a:ext uri="{FF2B5EF4-FFF2-40B4-BE49-F238E27FC236}">
+                <a16:creationId xmlns:a16="http://schemas.microsoft.com/office/drawing/2014/main" id="{004F3CF6-C830-48E0-B8CB-29271412C202}"/>
+              </a:ext>
+            </a:extLst>
+          </p:cNvPr>
+          <p:cNvSpPr/>
+          <p:nvPr/>
+        </p:nvSpPr>
+        <p:spPr>
+          <a:xfrm>
+            <a:off x="1981200" y="2452810"/>
+            <a:ext cx="1952380" cy="1952380"/>
+          </a:xfrm>
+          <a:prstGeom prst="ellipse">
+            <a:avLst/>
+          </a:prstGeom>
+          <a:solidFill>
+            <a:schemeClr val="accent6"/>
+          </a:solidFill>
+          <a:ln w="76200" cap="flat" cmpd="sng" algn="ctr">
+            <a:solidFill>
+              <a:srgbClr val="FFC000"/>
+            </a:solidFill>
+            <a:prstDash val="dash"/>
+            <a:miter lim="800000"/>
+            <a:headEnd type="none" w="med" len="med"/>
+            <a:tailEnd type="none" w="med" len="med"/>
+          </a:ln>
+        </p:spPr>
+        <p:style>
+          <a:lnRef idx="2">
+            <a:schemeClr val="accent1">
+              <a:shade val="50000"/>
+            </a:schemeClr>
+          </a:lnRef>
+          <a:fillRef idx="1">
+            <a:schemeClr val="accent1"/>
+          </a:fillRef>
+          <a:effectRef idx="0">
+            <a:schemeClr val="accent1"/>
+          </a:effectRef>
+          <a:fontRef idx="minor">
+            <a:schemeClr val="lt1"/>
+          </a:fontRef>
+        </p:style>
+        <p:txBody>
+          <a:bodyPr vert="horz" rtlCol="0" anchor="ctr" anchorCtr="0"/>
+          <a:lstStyle/>
+          <a:p>
+            <a:pPr algn="ctr"/>
+            <a:r>
+              <a:rPr lang="en-SG" sz="2800" dirty="0" err="1">
+                <a:ln>
+                  <a:solidFill>
+                    <a:schemeClr val="tx1"/>
+                  </a:solidFill>
+                </a:ln>
+                <a:solidFill>
+                  <a:srgbClr val="FF0000"/>
+                </a:solidFill>
+                <a:latin typeface="Calibri" panose="020F0502020204030204" pitchFamily="34" charset="0"/>
+              </a:rPr>
+              <a:t>SyncLab</a:t>
+            </a:r>
+            <a:r>
+              <a:rPr lang="en-SG" sz="2800" dirty="0">
+                <a:ln>
+                  <a:solidFill>
+                    <a:schemeClr val="tx1"/>
+                  </a:solidFill>
+                </a:ln>
+                <a:solidFill>
+                  <a:srgbClr val="FF0000"/>
+                </a:solidFill>
+                <a:latin typeface="Calibri" panose="020F0502020204030204" pitchFamily="34" charset="0"/>
+              </a:rPr>
+              <a:t> Copy Me</a:t>
+            </a:r>
+          </a:p>
+        </p:txBody>
+      </p:sp>
+      <p:sp>
+        <p:nvSpPr>
+          <p:cNvPr id="5" name="Normal Copy Shape">
+            <a:extLst>
+              <a:ext uri="{FF2B5EF4-FFF2-40B4-BE49-F238E27FC236}">
+                <a16:creationId xmlns:a16="http://schemas.microsoft.com/office/drawing/2014/main" id="{141D9B7A-8C12-44A6-AD6D-376AF15CE3CF}"/>
+              </a:ext>
+            </a:extLst>
+          </p:cNvPr>
+          <p:cNvSpPr/>
+          <p:nvPr/>
+        </p:nvSpPr>
+        <p:spPr>
+          <a:xfrm>
+            <a:off x="5210420" y="2452810"/>
+            <a:ext cx="1952380" cy="1952380"/>
+          </a:xfrm>
+          <a:prstGeom prst="ellipse">
+            <a:avLst/>
+          </a:prstGeom>
+        </p:spPr>
+        <p:style>
+          <a:lnRef idx="2">
+            <a:schemeClr val="accent1">
+              <a:shade val="50000"/>
+            </a:schemeClr>
+          </a:lnRef>
+          <a:fillRef idx="1">
+            <a:schemeClr val="accent1"/>
+          </a:fillRef>
+          <a:effectRef idx="0">
+            <a:schemeClr val="accent1"/>
+          </a:effectRef>
+          <a:fontRef idx="minor">
+            <a:schemeClr val="lt1"/>
+          </a:fontRef>
+        </p:style>
+        <p:txBody>
+          <a:bodyPr rtlCol="0" anchor="ctr"/>
+          <a:lstStyle/>
+          <a:p>
+            <a:pPr algn="ctr"/>
+            <a:r>
+              <a:rPr lang="en-SG" sz="2400" dirty="0"/>
+              <a:t>Normal Copy Me First</a:t>
+            </a:r>
+          </a:p>
+        </p:txBody>
+      </p:sp>
+      <p:sp>
+        <p:nvSpPr>
+          <p:cNvPr id="6" name="Text">
+            <a:extLst>
+              <a:ext uri="{FF2B5EF4-FFF2-40B4-BE49-F238E27FC236}">
+                <a16:creationId xmlns:a16="http://schemas.microsoft.com/office/drawing/2014/main" id="{CCF5F1A1-1A40-40C7-9986-59290FC164DB}"/>
+              </a:ext>
+            </a:extLst>
+          </p:cNvPr>
+          <p:cNvSpPr txBox="1"/>
+          <p:nvPr/>
+        </p:nvSpPr>
+        <p:spPr>
+          <a:xfrm>
+            <a:off x="953869" y="6096000"/>
+            <a:ext cx="7742761" cy="523220"/>
+          </a:xfrm>
+          <a:prstGeom prst="rect">
+            <a:avLst/>
+          </a:prstGeom>
+          <a:noFill/>
+        </p:spPr>
+        <p:txBody>
+          <a:bodyPr wrap="none" rtlCol="0">
+            <a:spAutoFit/>
+          </a:bodyPr>
+          <a:lstStyle/>
+          <a:p>
+            <a:r>
+              <a:rPr lang="en-US" sz="2800" b="1" dirty="0">
+                <a:solidFill>
+                  <a:schemeClr val="accent1"/>
+                </a:solidFill>
+              </a:rPr>
+              <a:t>Expected Output (pasted object is the right shape )</a:t>
+            </a:r>
+            <a:endParaRPr lang="en-SG" sz="2800" b="1" dirty="0">
+              <a:solidFill>
+                <a:schemeClr val="accent1"/>
+              </a:solidFill>
+            </a:endParaRPr>
+          </a:p>
+        </p:txBody>
+      </p:sp>
+      <p:sp>
+        <p:nvSpPr>
+          <p:cNvPr id="7" name="Pasted Shape">
+            <a:extLst>
+              <a:ext uri="{FF2B5EF4-FFF2-40B4-BE49-F238E27FC236}">
+                <a16:creationId xmlns:a16="http://schemas.microsoft.com/office/drawing/2014/main" id="{2CB28410-0DFB-4DF3-93E7-E0AFA209CFF4}"/>
+              </a:ext>
+            </a:extLst>
+          </p:cNvPr>
+          <p:cNvSpPr/>
+          <p:nvPr/>
+        </p:nvSpPr>
+        <p:spPr>
+          <a:xfrm>
+            <a:off x="5362820" y="2605210"/>
+            <a:ext cx="1952380" cy="1952380"/>
+          </a:xfrm>
+          <a:prstGeom prst="ellipse">
+            <a:avLst/>
+          </a:prstGeom>
+        </p:spPr>
+        <p:style>
+          <a:lnRef idx="2">
+            <a:schemeClr val="accent1">
+              <a:shade val="50000"/>
+            </a:schemeClr>
+          </a:lnRef>
+          <a:fillRef idx="1">
+            <a:schemeClr val="accent1"/>
+          </a:fillRef>
+          <a:effectRef idx="0">
+            <a:schemeClr val="accent1"/>
+          </a:effectRef>
+          <a:fontRef idx="minor">
+            <a:schemeClr val="lt1"/>
+          </a:fontRef>
+        </p:style>
+        <p:txBody>
+          <a:bodyPr rtlCol="0" anchor="ctr"/>
+          <a:lstStyle/>
+          <a:p>
+            <a:pPr algn="ctr"/>
+            <a:r>
+              <a:rPr lang="en-SG" sz="2400" dirty="0"/>
+              <a:t>Normal Copy Me First</a:t>
+            </a:r>
+          </a:p>
+        </p:txBody>
+      </p:sp>
+    </p:spTree>
+    <p:extLst>
+      <p:ext uri="{BB962C8B-B14F-4D97-AF65-F5344CB8AC3E}">
+        <p14:creationId xmlns:p14="http://schemas.microsoft.com/office/powerpoint/2010/main" val="3468950781"/>
       </p:ext>
     </p:extLst>
   </p:cSld>

</xml_diff>